<commit_message>
Updated slides with minor changes;
</commit_message>
<xml_diff>
--- a/RegEx/RegEx.pptx
+++ b/RegEx/RegEx.pptx
@@ -6174,36 +6174,12 @@
               <a:t>m,n</a:t>
             </a:r>
             <a:r>
-              <a:rPr lang="en-US" smtClean="0">
-                <a:latin typeface="Courier New" charset="0"/>
-                <a:ea typeface="Courier New" charset="0"/>
-                <a:cs typeface="Courier New" charset="0"/>
-              </a:rPr>
-              <a:t>}m through </a:t>
-            </a:r>
-            <a:r>
               <a:rPr lang="en-US" dirty="0" smtClean="0">
                 <a:latin typeface="Courier New" charset="0"/>
                 <a:ea typeface="Courier New" charset="0"/>
                 <a:cs typeface="Courier New" charset="0"/>
               </a:rPr>
-              <a:t>n</a:t>
-            </a:r>
-            <a:r>
-              <a:rPr lang="en-US" smtClean="0">
-                <a:latin typeface="Courier New" charset="0"/>
-                <a:ea typeface="Courier New" charset="0"/>
-                <a:cs typeface="Courier New" charset="0"/>
-              </a:rPr>
-              <a:t> </a:t>
-            </a:r>
-            <a:r>
-              <a:rPr lang="en-US" dirty="0" smtClean="0">
-                <a:latin typeface="Courier New" charset="0"/>
-                <a:ea typeface="Courier New" charset="0"/>
-                <a:cs typeface="Courier New" charset="0"/>
-              </a:rPr>
-              <a:t>of the preceding</a:t>
+              <a:t>}m through n of the preceding</a:t>
             </a:r>
           </a:p>
           <a:p>

</xml_diff>

<commit_message>
More minor changes to the RegEx slides;
</commit_message>
<xml_diff>
--- a/RegEx/RegEx.pptx
+++ b/RegEx/RegEx.pptx
@@ -346,6 +346,18 @@
   <p:clrMapOvr>
     <a:masterClrMapping/>
   </p:clrMapOvr>
+  <mc:AlternateContent xmlns:mc="http://schemas.openxmlformats.org/markup-compatibility/2006">
+    <mc:Choice xmlns:p14="http://schemas.microsoft.com/office/powerpoint/2010/main" Requires="p14">
+      <p:transition spd="slow" p14:dur="1500">
+        <p:random/>
+      </p:transition>
+    </mc:Choice>
+    <mc:Fallback>
+      <p:transition spd="slow">
+        <p:random/>
+      </p:transition>
+    </mc:Fallback>
+  </mc:AlternateContent>
 </p:sldLayout>
 </file>
 
@@ -598,6 +610,18 @@
   <p:clrMapOvr>
     <a:masterClrMapping/>
   </p:clrMapOvr>
+  <mc:AlternateContent xmlns:mc="http://schemas.openxmlformats.org/markup-compatibility/2006">
+    <mc:Choice xmlns:p14="http://schemas.microsoft.com/office/powerpoint/2010/main" Requires="p14">
+      <p:transition spd="slow" p14:dur="1500">
+        <p:random/>
+      </p:transition>
+    </mc:Choice>
+    <mc:Fallback>
+      <p:transition spd="slow">
+        <p:random/>
+      </p:transition>
+    </mc:Fallback>
+  </mc:AlternateContent>
 </p:sldLayout>
 </file>
 
@@ -835,6 +859,18 @@
   <p:clrMapOvr>
     <a:masterClrMapping/>
   </p:clrMapOvr>
+  <mc:AlternateContent xmlns:mc="http://schemas.openxmlformats.org/markup-compatibility/2006">
+    <mc:Choice xmlns:p14="http://schemas.microsoft.com/office/powerpoint/2010/main" Requires="p14">
+      <p:transition spd="slow" p14:dur="1500">
+        <p:random/>
+      </p:transition>
+    </mc:Choice>
+    <mc:Fallback>
+      <p:transition spd="slow">
+        <p:random/>
+      </p:transition>
+    </mc:Fallback>
+  </mc:AlternateContent>
 </p:sldLayout>
 </file>
 
@@ -1373,6 +1409,18 @@
   <p:clrMapOvr>
     <a:masterClrMapping/>
   </p:clrMapOvr>
+  <mc:AlternateContent xmlns:mc="http://schemas.openxmlformats.org/markup-compatibility/2006">
+    <mc:Choice xmlns:p14="http://schemas.microsoft.com/office/powerpoint/2010/main" Requires="p14">
+      <p:transition spd="slow" p14:dur="1500">
+        <p:random/>
+      </p:transition>
+    </mc:Choice>
+    <mc:Fallback>
+      <p:transition spd="slow">
+        <p:random/>
+      </p:transition>
+    </mc:Fallback>
+  </mc:AlternateContent>
 </p:sldLayout>
 </file>
 
@@ -1610,6 +1658,18 @@
   <p:clrMapOvr>
     <a:masterClrMapping/>
   </p:clrMapOvr>
+  <mc:AlternateContent xmlns:mc="http://schemas.openxmlformats.org/markup-compatibility/2006">
+    <mc:Choice xmlns:p14="http://schemas.microsoft.com/office/powerpoint/2010/main" Requires="p14">
+      <p:transition spd="slow" p14:dur="1500">
+        <p:random/>
+      </p:transition>
+    </mc:Choice>
+    <mc:Fallback>
+      <p:transition spd="slow">
+        <p:random/>
+      </p:transition>
+    </mc:Fallback>
+  </mc:AlternateContent>
 </p:sldLayout>
 </file>
 
@@ -2142,6 +2202,18 @@
   <p:clrMapOvr>
     <a:masterClrMapping/>
   </p:clrMapOvr>
+  <mc:AlternateContent xmlns:mc="http://schemas.openxmlformats.org/markup-compatibility/2006">
+    <mc:Choice xmlns:p14="http://schemas.microsoft.com/office/powerpoint/2010/main" Requires="p14">
+      <p:transition spd="slow" p14:dur="1500">
+        <p:random/>
+      </p:transition>
+    </mc:Choice>
+    <mc:Fallback>
+      <p:transition spd="slow">
+        <p:random/>
+      </p:transition>
+    </mc:Fallback>
+  </mc:AlternateContent>
 </p:sldLayout>
 </file>
 
@@ -2911,6 +2983,18 @@
   <p:clrMapOvr>
     <a:masterClrMapping/>
   </p:clrMapOvr>
+  <mc:AlternateContent xmlns:mc="http://schemas.openxmlformats.org/markup-compatibility/2006">
+    <mc:Choice xmlns:p14="http://schemas.microsoft.com/office/powerpoint/2010/main" Requires="p14">
+      <p:transition spd="slow" p14:dur="1500">
+        <p:random/>
+      </p:transition>
+    </mc:Choice>
+    <mc:Fallback>
+      <p:transition spd="slow">
+        <p:random/>
+      </p:transition>
+    </mc:Fallback>
+  </mc:AlternateContent>
 </p:sldLayout>
 </file>
 
@@ -3081,6 +3165,18 @@
   <p:clrMapOvr>
     <a:masterClrMapping/>
   </p:clrMapOvr>
+  <mc:AlternateContent xmlns:mc="http://schemas.openxmlformats.org/markup-compatibility/2006">
+    <mc:Choice xmlns:p14="http://schemas.microsoft.com/office/powerpoint/2010/main" Requires="p14">
+      <p:transition spd="slow" p14:dur="1500">
+        <p:random/>
+      </p:transition>
+    </mc:Choice>
+    <mc:Fallback>
+      <p:transition spd="slow">
+        <p:random/>
+      </p:transition>
+    </mc:Fallback>
+  </mc:AlternateContent>
 </p:sldLayout>
 </file>
 
@@ -3310,6 +3406,18 @@
   <p:clrMapOvr>
     <a:masterClrMapping/>
   </p:clrMapOvr>
+  <mc:AlternateContent xmlns:mc="http://schemas.openxmlformats.org/markup-compatibility/2006">
+    <mc:Choice xmlns:p14="http://schemas.microsoft.com/office/powerpoint/2010/main" Requires="p14">
+      <p:transition spd="slow" p14:dur="1500">
+        <p:random/>
+      </p:transition>
+    </mc:Choice>
+    <mc:Fallback>
+      <p:transition spd="slow">
+        <p:random/>
+      </p:transition>
+    </mc:Fallback>
+  </mc:AlternateContent>
 </p:sldLayout>
 </file>
 
@@ -3475,6 +3583,18 @@
   <p:clrMapOvr>
     <a:masterClrMapping/>
   </p:clrMapOvr>
+  <mc:AlternateContent xmlns:mc="http://schemas.openxmlformats.org/markup-compatibility/2006">
+    <mc:Choice xmlns:p14="http://schemas.microsoft.com/office/powerpoint/2010/main" Requires="p14">
+      <p:transition spd="slow" p14:dur="1500">
+        <p:random/>
+      </p:transition>
+    </mc:Choice>
+    <mc:Fallback>
+      <p:transition spd="slow">
+        <p:random/>
+      </p:transition>
+    </mc:Fallback>
+  </mc:AlternateContent>
 </p:sldLayout>
 </file>
 
@@ -3770,6 +3890,18 @@
   <p:clrMapOvr>
     <a:masterClrMapping/>
   </p:clrMapOvr>
+  <mc:AlternateContent xmlns:mc="http://schemas.openxmlformats.org/markup-compatibility/2006">
+    <mc:Choice xmlns:p14="http://schemas.microsoft.com/office/powerpoint/2010/main" Requires="p14">
+      <p:transition spd="slow" p14:dur="1500">
+        <p:random/>
+      </p:transition>
+    </mc:Choice>
+    <mc:Fallback>
+      <p:transition spd="slow">
+        <p:random/>
+      </p:transition>
+    </mc:Fallback>
+  </mc:AlternateContent>
 </p:sldLayout>
 </file>
 
@@ -3997,6 +4129,18 @@
   <p:clrMapOvr>
     <a:masterClrMapping/>
   </p:clrMapOvr>
+  <mc:AlternateContent xmlns:mc="http://schemas.openxmlformats.org/markup-compatibility/2006">
+    <mc:Choice xmlns:p14="http://schemas.microsoft.com/office/powerpoint/2010/main" Requires="p14">
+      <p:transition spd="slow" p14:dur="1500">
+        <p:random/>
+      </p:transition>
+    </mc:Choice>
+    <mc:Fallback>
+      <p:transition spd="slow">
+        <p:random/>
+      </p:transition>
+    </mc:Fallback>
+  </mc:AlternateContent>
 </p:sldLayout>
 </file>
 
@@ -4371,6 +4515,18 @@
   <p:clrMapOvr>
     <a:masterClrMapping/>
   </p:clrMapOvr>
+  <mc:AlternateContent xmlns:mc="http://schemas.openxmlformats.org/markup-compatibility/2006">
+    <mc:Choice xmlns:p14="http://schemas.microsoft.com/office/powerpoint/2010/main" Requires="p14">
+      <p:transition spd="slow" p14:dur="1500">
+        <p:random/>
+      </p:transition>
+    </mc:Choice>
+    <mc:Fallback>
+      <p:transition spd="slow">
+        <p:random/>
+      </p:transition>
+    </mc:Fallback>
+  </mc:AlternateContent>
 </p:sldLayout>
 </file>
 
@@ -4484,6 +4640,18 @@
   <p:clrMapOvr>
     <a:masterClrMapping/>
   </p:clrMapOvr>
+  <mc:AlternateContent xmlns:mc="http://schemas.openxmlformats.org/markup-compatibility/2006">
+    <mc:Choice xmlns:p14="http://schemas.microsoft.com/office/powerpoint/2010/main" Requires="p14">
+      <p:transition spd="slow" p14:dur="1500">
+        <p:random/>
+      </p:transition>
+    </mc:Choice>
+    <mc:Fallback>
+      <p:transition spd="slow">
+        <p:random/>
+      </p:transition>
+    </mc:Fallback>
+  </mc:AlternateContent>
 </p:sldLayout>
 </file>
 
@@ -4574,6 +4742,18 @@
   <p:clrMapOvr>
     <a:masterClrMapping/>
   </p:clrMapOvr>
+  <mc:AlternateContent xmlns:mc="http://schemas.openxmlformats.org/markup-compatibility/2006">
+    <mc:Choice xmlns:p14="http://schemas.microsoft.com/office/powerpoint/2010/main" Requires="p14">
+      <p:transition spd="slow" p14:dur="1500">
+        <p:random/>
+      </p:transition>
+    </mc:Choice>
+    <mc:Fallback>
+      <p:transition spd="slow">
+        <p:random/>
+      </p:transition>
+    </mc:Fallback>
+  </mc:AlternateContent>
 </p:sldLayout>
 </file>
 
@@ -4818,6 +4998,18 @@
   <p:clrMapOvr>
     <a:masterClrMapping/>
   </p:clrMapOvr>
+  <mc:AlternateContent xmlns:mc="http://schemas.openxmlformats.org/markup-compatibility/2006">
+    <mc:Choice xmlns:p14="http://schemas.microsoft.com/office/powerpoint/2010/main" Requires="p14">
+      <p:transition spd="slow" p14:dur="1500">
+        <p:random/>
+      </p:transition>
+    </mc:Choice>
+    <mc:Fallback>
+      <p:transition spd="slow">
+        <p:random/>
+      </p:transition>
+    </mc:Fallback>
+  </mc:AlternateContent>
 </p:sldLayout>
 </file>
 
@@ -5070,6 +5262,18 @@
   <p:clrMapOvr>
     <a:masterClrMapping/>
   </p:clrMapOvr>
+  <mc:AlternateContent xmlns:mc="http://schemas.openxmlformats.org/markup-compatibility/2006">
+    <mc:Choice xmlns:p14="http://schemas.microsoft.com/office/powerpoint/2010/main" Requires="p14">
+      <p:transition spd="slow" p14:dur="1500">
+        <p:random/>
+      </p:transition>
+    </mc:Choice>
+    <mc:Fallback>
+      <p:transition spd="slow">
+        <p:random/>
+      </p:transition>
+    </mc:Fallback>
+  </mc:AlternateContent>
 </p:sldLayout>
 </file>
 
@@ -5363,6 +5567,18 @@
     <p:sldLayoutId id="2147483658" r:id="rId16"/>
     <p:sldLayoutId id="2147483659" r:id="rId17"/>
   </p:sldLayoutIdLst>
+  <mc:AlternateContent xmlns:mc="http://schemas.openxmlformats.org/markup-compatibility/2006">
+    <mc:Choice xmlns:p14="http://schemas.microsoft.com/office/powerpoint/2010/main" Requires="p14">
+      <p:transition spd="slow" p14:dur="1500">
+        <p:random/>
+      </p:transition>
+    </mc:Choice>
+    <mc:Fallback>
+      <p:transition spd="slow">
+        <p:random/>
+      </p:transition>
+    </mc:Fallback>
+  </mc:AlternateContent>
   <p:txStyles>
     <p:titleStyle>
       <a:lvl1pPr algn="r" defTabSz="914400" rtl="0" eaLnBrk="1" latinLnBrk="0" hangingPunct="1">
@@ -5727,6 +5943,25 @@
   <p:clrMapOvr>
     <a:masterClrMapping/>
   </p:clrMapOvr>
+  <mc:AlternateContent xmlns:mc="http://schemas.openxmlformats.org/markup-compatibility/2006">
+    <mc:Choice xmlns:p14="http://schemas.microsoft.com/office/powerpoint/2010/main" Requires="p14">
+      <p:transition spd="slow" p14:dur="1500">
+        <p:random/>
+      </p:transition>
+    </mc:Choice>
+    <mc:Fallback>
+      <p:transition spd="slow">
+        <p:random/>
+      </p:transition>
+    </mc:Fallback>
+  </mc:AlternateContent>
+  <p:timing>
+    <p:tnLst>
+      <p:par>
+        <p:cTn id="1" dur="indefinite" restart="never" nodeType="tmRoot"/>
+      </p:par>
+    </p:tnLst>
+  </p:timing>
 </p:sld>
 </file>
 
@@ -5822,6 +6057,25 @@
   <p:clrMapOvr>
     <a:masterClrMapping/>
   </p:clrMapOvr>
+  <mc:AlternateContent xmlns:mc="http://schemas.openxmlformats.org/markup-compatibility/2006">
+    <mc:Choice xmlns:p14="http://schemas.microsoft.com/office/powerpoint/2010/main" Requires="p14">
+      <p:transition spd="slow" p14:dur="1500">
+        <p:random/>
+      </p:transition>
+    </mc:Choice>
+    <mc:Fallback>
+      <p:transition spd="slow">
+        <p:random/>
+      </p:transition>
+    </mc:Fallback>
+  </mc:AlternateContent>
+  <p:timing>
+    <p:tnLst>
+      <p:par>
+        <p:cTn id="1" dur="indefinite" restart="never" nodeType="tmRoot"/>
+      </p:par>
+    </p:tnLst>
+  </p:timing>
 </p:sld>
 </file>
 
@@ -6391,6 +6645,25 @@
   <p:clrMapOvr>
     <a:masterClrMapping/>
   </p:clrMapOvr>
+  <mc:AlternateContent xmlns:mc="http://schemas.openxmlformats.org/markup-compatibility/2006">
+    <mc:Choice xmlns:p14="http://schemas.microsoft.com/office/powerpoint/2010/main" Requires="p14">
+      <p:transition spd="slow" p14:dur="1500">
+        <p:random/>
+      </p:transition>
+    </mc:Choice>
+    <mc:Fallback>
+      <p:transition spd="slow">
+        <p:random/>
+      </p:transition>
+    </mc:Fallback>
+  </mc:AlternateContent>
+  <p:timing>
+    <p:tnLst>
+      <p:par>
+        <p:cTn id="1" dur="indefinite" restart="never" nodeType="tmRoot"/>
+      </p:par>
+    </p:tnLst>
+  </p:timing>
 </p:sld>
 </file>
 
@@ -6473,6 +6746,25 @@
   <p:clrMapOvr>
     <a:masterClrMapping/>
   </p:clrMapOvr>
+  <mc:AlternateContent xmlns:mc="http://schemas.openxmlformats.org/markup-compatibility/2006">
+    <mc:Choice xmlns:p14="http://schemas.microsoft.com/office/powerpoint/2010/main" Requires="p14">
+      <p:transition spd="slow" p14:dur="1500">
+        <p:random/>
+      </p:transition>
+    </mc:Choice>
+    <mc:Fallback>
+      <p:transition spd="slow">
+        <p:random/>
+      </p:transition>
+    </mc:Fallback>
+  </mc:AlternateContent>
+  <p:timing>
+    <p:tnLst>
+      <p:par>
+        <p:cTn id="1" dur="indefinite" restart="never" nodeType="tmRoot"/>
+      </p:par>
+    </p:tnLst>
+  </p:timing>
 </p:sld>
 </file>
 
@@ -6538,19 +6830,19 @@
             </a:pPr>
             <a:r>
               <a:rPr lang="en-US" dirty="0"/>
-              <a:t>Provide a regex pattern that will successfully match against the .pass </a:t>
+              <a:t>Provide a regex pattern that will successfully match against the </a:t>
             </a:r>
             <a:r>
               <a:rPr lang="en-US" dirty="0" smtClean="0"/>
-              <a:t>list but </a:t>
+              <a:t>pass list but </a:t>
             </a:r>
             <a:r>
               <a:rPr lang="en-US" dirty="0"/>
-              <a:t>also not match those in the .fail </a:t>
+              <a:t>also not match those in the </a:t>
             </a:r>
             <a:r>
               <a:rPr lang="en-US" dirty="0" smtClean="0"/>
-              <a:t>list.</a:t>
+              <a:t>fail list.</a:t>
             </a:r>
             <a:endParaRPr lang="en-US" dirty="0"/>
           </a:p>
@@ -6560,7 +6852,23 @@
             </a:pPr>
             <a:r>
               <a:rPr lang="en-US" dirty="0"/>
-              <a:t>Add the pattern that will pass all .pass cases and not pass all .fail cases listed below:</a:t>
+              <a:t>Add the pattern that will pass all </a:t>
+            </a:r>
+            <a:r>
+              <a:rPr lang="en-US" dirty="0" smtClean="0"/>
+              <a:t>pass </a:t>
+            </a:r>
+            <a:r>
+              <a:rPr lang="en-US" dirty="0"/>
+              <a:t>cases and not pass all </a:t>
+            </a:r>
+            <a:r>
+              <a:rPr lang="en-US" dirty="0" smtClean="0"/>
+              <a:t>fail </a:t>
+            </a:r>
+            <a:r>
+              <a:rPr lang="en-US" dirty="0"/>
+              <a:t>cases listed below:</a:t>
             </a:r>
           </a:p>
           <a:p>
@@ -6682,6 +6990,25 @@
   <p:clrMapOvr>
     <a:masterClrMapping/>
   </p:clrMapOvr>
+  <mc:AlternateContent xmlns:mc="http://schemas.openxmlformats.org/markup-compatibility/2006">
+    <mc:Choice xmlns:p14="http://schemas.microsoft.com/office/powerpoint/2010/main" Requires="p14">
+      <p:transition spd="slow" p14:dur="1500">
+        <p:random/>
+      </p:transition>
+    </mc:Choice>
+    <mc:Fallback>
+      <p:transition spd="slow">
+        <p:random/>
+      </p:transition>
+    </mc:Fallback>
+  </mc:AlternateContent>
+  <p:timing>
+    <p:tnLst>
+      <p:par>
+        <p:cTn id="1" dur="indefinite" restart="never" nodeType="tmRoot"/>
+      </p:par>
+    </p:tnLst>
+  </p:timing>
 </p:sld>
 </file>
 
@@ -6747,19 +7074,19 @@
             </a:pPr>
             <a:r>
               <a:rPr lang="en-US" dirty="0"/>
-              <a:t>Provide a regex pattern that will successfully match against the .pass </a:t>
+              <a:t>Provide a regex pattern that will successfully match against the </a:t>
             </a:r>
             <a:r>
               <a:rPr lang="en-US" dirty="0" smtClean="0"/>
-              <a:t>list but </a:t>
+              <a:t>pass list but </a:t>
             </a:r>
             <a:r>
               <a:rPr lang="en-US" dirty="0"/>
-              <a:t>also not match those in the .fail </a:t>
+              <a:t>also not match those in the </a:t>
             </a:r>
             <a:r>
               <a:rPr lang="en-US" dirty="0" smtClean="0"/>
-              <a:t>list.</a:t>
+              <a:t>fail list.</a:t>
             </a:r>
             <a:endParaRPr lang="en-US" dirty="0"/>
           </a:p>
@@ -6769,7 +7096,23 @@
             </a:pPr>
             <a:r>
               <a:rPr lang="en-US" dirty="0"/>
-              <a:t>Add the pattern that will pass all .pass cases and not pass all .fail cases listed below:</a:t>
+              <a:t>Add the pattern that will pass all </a:t>
+            </a:r>
+            <a:r>
+              <a:rPr lang="en-US" dirty="0" smtClean="0"/>
+              <a:t>pass </a:t>
+            </a:r>
+            <a:r>
+              <a:rPr lang="en-US" dirty="0"/>
+              <a:t>cases and not pass all </a:t>
+            </a:r>
+            <a:r>
+              <a:rPr lang="en-US" dirty="0" smtClean="0"/>
+              <a:t>fail </a:t>
+            </a:r>
+            <a:r>
+              <a:rPr lang="en-US" dirty="0"/>
+              <a:t>cases listed below:</a:t>
             </a:r>
           </a:p>
           <a:p>
@@ -6875,6 +7218,25 @@
   <p:clrMapOvr>
     <a:masterClrMapping/>
   </p:clrMapOvr>
+  <mc:AlternateContent xmlns:mc="http://schemas.openxmlformats.org/markup-compatibility/2006">
+    <mc:Choice xmlns:p14="http://schemas.microsoft.com/office/powerpoint/2010/main" Requires="p14">
+      <p:transition spd="med" p14:dur="700">
+        <p:fade/>
+      </p:transition>
+    </mc:Choice>
+    <mc:Fallback>
+      <p:transition spd="med">
+        <p:fade/>
+      </p:transition>
+    </mc:Fallback>
+  </mc:AlternateContent>
+  <p:timing>
+    <p:tnLst>
+      <p:par>
+        <p:cTn id="1" dur="indefinite" restart="never" nodeType="tmRoot"/>
+      </p:par>
+    </p:tnLst>
+  </p:timing>
 </p:sld>
 </file>
 
@@ -7066,6 +7428,25 @@
   <p:clrMapOvr>
     <a:masterClrMapping/>
   </p:clrMapOvr>
+  <mc:AlternateContent xmlns:mc="http://schemas.openxmlformats.org/markup-compatibility/2006">
+    <mc:Choice xmlns:p14="http://schemas.microsoft.com/office/powerpoint/2010/main" Requires="p14">
+      <p:transition spd="slow" p14:dur="1500">
+        <p:random/>
+      </p:transition>
+    </mc:Choice>
+    <mc:Fallback>
+      <p:transition spd="slow">
+        <p:random/>
+      </p:transition>
+    </mc:Fallback>
+  </mc:AlternateContent>
+  <p:timing>
+    <p:tnLst>
+      <p:par>
+        <p:cTn id="1" dur="indefinite" restart="never" nodeType="tmRoot"/>
+      </p:par>
+    </p:tnLst>
+  </p:timing>
 </p:sld>
 </file>
 

</xml_diff>